<commit_message>
Update Agregar trend following a un portafolio.pptx
</commit_message>
<xml_diff>
--- a/presentations/Agregar trend following a un portafolio.pptx
+++ b/presentations/Agregar trend following a un portafolio.pptx
@@ -17,6 +17,7 @@
     <p:sldId id="265" r:id="rId11"/>
     <p:sldId id="266" r:id="rId12"/>
     <p:sldId id="267" r:id="rId13"/>
+    <p:sldId id="268" r:id="rId14"/>
   </p:sldIdLst>
   <p:sldSz cx="12192000" cy="6858000"/>
   <p:notesSz cx="6858000" cy="9144000"/>
@@ -132,6 +133,1534 @@
     </p:ext>
   </p:extLst>
 </p:presentation>
+</file>
+
+<file path=ppt/charts/chartEx1.xml><?xml version="1.0" encoding="utf-8"?>
+<cx:chartSpace xmlns:a="http://schemas.openxmlformats.org/drawingml/2006/main" xmlns:r="http://schemas.openxmlformats.org/officeDocument/2006/relationships" xmlns:cx="http://schemas.microsoft.com/office/drawing/2014/chartex">
+  <cx:chart>
+    <cx:title pos="t" align="ctr" overlay="0">
+      <cx:tx>
+        <cx:txData>
+          <cx:v>Database Overview                xxxxx</cx:v>
+        </cx:txData>
+      </cx:tx>
+      <cx:txPr>
+        <a:bodyPr spcFirstLastPara="1" vertOverflow="ellipsis" horzOverflow="overflow" wrap="square" lIns="0" tIns="0" rIns="0" bIns="0" anchor="ctr" anchorCtr="1"/>
+        <a:lstStyle/>
+        <a:p>
+          <a:pPr algn="ctr" rtl="0">
+            <a:defRPr>
+              <a:latin typeface="Courier New" panose="02070309020205020404" pitchFamily="49" charset="0"/>
+              <a:ea typeface="Courier New" panose="02070309020205020404" pitchFamily="49" charset="0"/>
+              <a:cs typeface="Courier New" panose="02070309020205020404" pitchFamily="49" charset="0"/>
+            </a:defRPr>
+          </a:pPr>
+          <a:r>
+            <a:rPr lang="en-US" sz="1400" b="0" i="0" u="none" strike="noStrike" baseline="0">
+              <a:solidFill>
+                <a:sysClr val="windowText" lastClr="000000">
+                  <a:lumMod val="65000"/>
+                  <a:lumOff val="35000"/>
+                </a:sysClr>
+              </a:solidFill>
+              <a:latin typeface="Courier New" panose="02070309020205020404" pitchFamily="49" charset="0"/>
+              <a:cs typeface="Courier New" panose="02070309020205020404" pitchFamily="49" charset="0"/>
+            </a:rPr>
+            <a:t>Database Overview                xxxxx</a:t>
+          </a:r>
+        </a:p>
+      </cx:txPr>
+    </cx:title>
+    <cx:plotArea>
+      <cx:plotAreaRegion/>
+    </cx:plotArea>
+  </cx:chart>
+  <cx:spPr>
+    <a:ln>
+      <a:noFill/>
+    </a:ln>
+  </cx:spPr>
+</cx:chartSpace>
+</file>
+
+<file path=ppt/charts/chartEx2.xml><?xml version="1.0" encoding="utf-8"?>
+<cx:chartSpace xmlns:a="http://schemas.openxmlformats.org/drawingml/2006/main" xmlns:r="http://schemas.openxmlformats.org/officeDocument/2006/relationships" xmlns:cx="http://schemas.microsoft.com/office/drawing/2014/chartex">
+  <cx:chartData>
+    <cx:externalData r:id="rId1" cx:autoUpdate="0"/>
+    <cx:data id="0">
+      <cx:strDim type="cat">
+        <cx:f>Sheet1!$A$7:$A$97</cx:f>
+        <cx:lvl ptCount="91">
+          <cx:pt idx="0">Man AHL</cx:pt>
+          <cx:pt idx="1">AlphaSimplex Group</cx:pt>
+          <cx:pt idx="2">Graham Capital Mgmt LP</cx:pt>
+          <cx:pt idx="3">Aspect Capital Limited</cx:pt>
+          <cx:pt idx="4">Lynx Asset Management</cx:pt>
+          <cx:pt idx="5">Transtrend BV</cx:pt>
+          <cx:pt idx="6">PIMCO</cx:pt>
+          <cx:pt idx="7">Campbell &amp; Company</cx:pt>
+          <cx:pt idx="8">Systematica Investments</cx:pt>
+          <cx:pt idx="9">Catalyst Capital Advisors</cx:pt>
+          <cx:pt idx="10">AQR Capital Management</cx:pt>
+          <cx:pt idx="11">Quest Partners</cx:pt>
+          <cx:pt idx="12">DUNN Capital Management</cx:pt>
+          <cx:pt idx="13">Crabel Capital Mgmt</cx:pt>
+          <cx:pt idx="14">Welton Investment Partners</cx:pt>
+          <cx:pt idx="15">Dynamic Beta Investments</cx:pt>
+          <cx:pt idx="16">Fort LP</cx:pt>
+          <cx:pt idx="17">Quantica Capital AG</cx:pt>
+          <cx:pt idx="18">BH-DG Systematic Trading</cx:pt>
+          <cx:pt idx="19">EMC Capital Advisors</cx:pt>
+          <cx:pt idx="20">Capital Fund Management</cx:pt>
+          <cx:pt idx="21">Metori Capital Management</cx:pt>
+          <cx:pt idx="22">Tudor Investment Corp</cx:pt>
+          <cx:pt idx="23">LongTail Alpha</cx:pt>
+          <cx:pt idx="24">SEB Group</cx:pt>
+          <cx:pt idx="25">Winton Capital Management</cx:pt>
+          <cx:pt idx="26">KeyQuant SAS</cx:pt>
+          <cx:pt idx="27">Goldman Sachs Management</cx:pt>
+          <cx:pt idx="28">Candriam Investors Group</cx:pt>
+          <cx:pt idx="29">Superfund Capital Management</cx:pt>
+          <cx:pt idx="30">Drury Capital</cx:pt>
+          <cx:pt idx="31">Eckhardt Trading Company</cx:pt>
+          <cx:pt idx="32">Chesapeake Capital Corporation</cx:pt>
+          <cx:pt idx="33">Schot Capital Limited</cx:pt>
+          <cx:pt idx="34">Rational Advisors</cx:pt>
+          <cx:pt idx="35">Mulvaney Capital Management</cx:pt>
+          <cx:pt idx="36">Allianz Global Investors</cx:pt>
+          <cx:pt idx="37">Auspice Capital Advisors</cx:pt>
+          <cx:pt idx="38">Estlander &amp; Partners</cx:pt>
+          <cx:pt idx="39">Eagle Trading Systems</cx:pt>
+          <cx:pt idx="40">Altis Partners Jersey Limited</cx:pt>
+          <cx:pt idx="41">WisdomTree Investments</cx:pt>
+          <cx:pt idx="42">Algorithmic Trading Portfolio</cx:pt>
+          <cx:pt idx="43">La Financiere de l'Echiquier</cx:pt>
+          <cx:pt idx="44">ARP Investments</cx:pt>
+          <cx:pt idx="45">Fulcrum Asset Management</cx:pt>
+          <cx:pt idx="46">SMN Investment Services</cx:pt>
+          <cx:pt idx="47">Salus Alpha Capital</cx:pt>
+          <cx:pt idx="48">Southwest Managed Investments</cx:pt>
+          <cx:pt idx="49">JanusHenderson</cx:pt>
+          <cx:pt idx="50">Wimmer Horizon</cx:pt>
+          <cx:pt idx="51">Fisch Asset Management</cx:pt>
+          <cx:pt idx="52">Tactical Investment Management Corp</cx:pt>
+          <cx:pt idx="53">Trident Capital Management</cx:pt>
+          <cx:pt idx="54">O'Brien Investment Group</cx:pt>
+          <cx:pt idx="55">Eclipse Capital Management</cx:pt>
+          <cx:pt idx="56">Garraway Capital Management</cx:pt>
+          <cx:pt idx="57">FTC Capital</cx:pt>
+          <cx:pt idx="58">Sterling Partners Quantitative Investments</cx:pt>
+          <cx:pt idx="59">Bantleon</cx:pt>
+          <cx:pt idx="60">Hamer Trading</cx:pt>
+          <cx:pt idx="61">Finaltis</cx:pt>
+          <cx:pt idx="62">Longboard Asset Management LP</cx:pt>
+          <cx:pt idx="63">Spring Valley Asset Management</cx:pt>
+          <cx:pt idx="64">Seven Capital Management</cx:pt>
+          <cx:pt idx="65">Blackwater Capital Management</cx:pt>
+          <cx:pt idx="66">Mandatum</cx:pt>
+          <cx:pt idx="67">Quality Capital Management</cx:pt>
+          <cx:pt idx="68">TGCC</cx:pt>
+          <cx:pt idx="69">Limmat Capital Alternative Investments</cx:pt>
+          <cx:pt idx="70">514 Capital Partners</cx:pt>
+          <cx:pt idx="71">Tendance Finance</cx:pt>
+          <cx:pt idx="72">QQFund.com</cx:pt>
+          <cx:pt idx="73">WaveFront Global Asset Management Corp</cx:pt>
+          <cx:pt idx="74">Adalpha Asset Management</cx:pt>
+          <cx:pt idx="75">Katonah Eve</cx:pt>
+          <cx:pt idx="76">WG Wealth Guardian</cx:pt>
+          <cx:pt idx="77">Purple Valley Capital</cx:pt>
+          <cx:pt idx="78">Melissinos Trading</cx:pt>
+          <cx:pt idx="79">THS Capital Management</cx:pt>
+          <cx:pt idx="80">IDS Capital</cx:pt>
+          <cx:pt idx="81">Incline Investment Management</cx:pt>
+          <cx:pt idx="82">MS Capital Management Limited</cx:pt>
+          <cx:pt idx="83">Michael J Frischmeyer</cx:pt>
+          <cx:pt idx="84">Parizek Capital</cx:pt>
+          <cx:pt idx="85">Bastiat Capital</cx:pt>
+          <cx:pt idx="86">Absolute Return Capital Management</cx:pt>
+          <cx:pt idx="87">Anderson Creek Trading</cx:pt>
+          <cx:pt idx="88">Tiercel SEZC</cx:pt>
+          <cx:pt idx="89">GN Capital</cx:pt>
+          <cx:pt idx="90">Talenta Capital</cx:pt>
+        </cx:lvl>
+      </cx:strDim>
+      <cx:numDim type="size">
+        <cx:f>Sheet1!$B$7:$B$97</cx:f>
+        <cx:lvl ptCount="91" formatCode="General">
+          <cx:pt idx="0">31648</cx:pt>
+          <cx:pt idx="1">19172</cx:pt>
+          <cx:pt idx="2">17086</cx:pt>
+          <cx:pt idx="3">10027</cx:pt>
+          <cx:pt idx="4">9116</cx:pt>
+          <cx:pt idx="5">6379</cx:pt>
+          <cx:pt idx="6">5280</cx:pt>
+          <cx:pt idx="7">4514</cx:pt>
+          <cx:pt idx="8">4300</cx:pt>
+          <cx:pt idx="9">4090</cx:pt>
+          <cx:pt idx="10">3996</cx:pt>
+          <cx:pt idx="11">2709</cx:pt>
+          <cx:pt idx="12">2357</cx:pt>
+          <cx:pt idx="13">2082</cx:pt>
+          <cx:pt idx="14">1701</cx:pt>
+          <cx:pt idx="15">1385</cx:pt>
+          <cx:pt idx="16">1281</cx:pt>
+          <cx:pt idx="17">1086</cx:pt>
+          <cx:pt idx="18">909</cx:pt>
+          <cx:pt idx="19">859</cx:pt>
+          <cx:pt idx="20">825</cx:pt>
+          <cx:pt idx="21">742</cx:pt>
+          <cx:pt idx="22">719</cx:pt>
+          <cx:pt idx="23">627</cx:pt>
+          <cx:pt idx="24">602</cx:pt>
+          <cx:pt idx="25">556</cx:pt>
+          <cx:pt idx="26">500</cx:pt>
+          <cx:pt idx="27">445</cx:pt>
+          <cx:pt idx="28">401</cx:pt>
+          <cx:pt idx="29">366</cx:pt>
+          <cx:pt idx="30">331</cx:pt>
+          <cx:pt idx="31">309</cx:pt>
+          <cx:pt idx="32">244</cx:pt>
+          <cx:pt idx="33">201</cx:pt>
+          <cx:pt idx="34">196</cx:pt>
+          <cx:pt idx="35">194</cx:pt>
+          <cx:pt idx="36">180</cx:pt>
+          <cx:pt idx="37">172</cx:pt>
+          <cx:pt idx="38">166</cx:pt>
+          <cx:pt idx="39">162</cx:pt>
+          <cx:pt idx="40">159</cx:pt>
+          <cx:pt idx="41">139</cx:pt>
+          <cx:pt idx="42">135</cx:pt>
+          <cx:pt idx="43">129</cx:pt>
+          <cx:pt idx="44">121</cx:pt>
+          <cx:pt idx="45">121</cx:pt>
+          <cx:pt idx="46">117</cx:pt>
+          <cx:pt idx="47">100</cx:pt>
+          <cx:pt idx="48">99</cx:pt>
+          <cx:pt idx="49">99</cx:pt>
+          <cx:pt idx="50">87</cx:pt>
+          <cx:pt idx="51">70</cx:pt>
+          <cx:pt idx="52">65</cx:pt>
+          <cx:pt idx="53">60</cx:pt>
+          <cx:pt idx="54">59</cx:pt>
+          <cx:pt idx="55">58</cx:pt>
+          <cx:pt idx="56">51</cx:pt>
+          <cx:pt idx="57">42</cx:pt>
+          <cx:pt idx="58">40</cx:pt>
+          <cx:pt idx="59">38</cx:pt>
+          <cx:pt idx="60">38</cx:pt>
+          <cx:pt idx="61">37</cx:pt>
+          <cx:pt idx="62">37</cx:pt>
+          <cx:pt idx="63">31</cx:pt>
+          <cx:pt idx="64">30</cx:pt>
+          <cx:pt idx="65">30</cx:pt>
+          <cx:pt idx="66">28</cx:pt>
+          <cx:pt idx="67">24</cx:pt>
+          <cx:pt idx="68">22</cx:pt>
+          <cx:pt idx="69">19</cx:pt>
+          <cx:pt idx="70">19</cx:pt>
+          <cx:pt idx="71">18</cx:pt>
+          <cx:pt idx="72">17</cx:pt>
+          <cx:pt idx="73">15</cx:pt>
+          <cx:pt idx="74">12</cx:pt>
+          <cx:pt idx="75">11</cx:pt>
+          <cx:pt idx="76">11</cx:pt>
+          <cx:pt idx="77">8</cx:pt>
+          <cx:pt idx="78">8</cx:pt>
+          <cx:pt idx="79">5</cx:pt>
+          <cx:pt idx="80">5</cx:pt>
+          <cx:pt idx="81">5</cx:pt>
+          <cx:pt idx="82">4</cx:pt>
+          <cx:pt idx="83">3</cx:pt>
+          <cx:pt idx="84">2</cx:pt>
+          <cx:pt idx="85">2</cx:pt>
+          <cx:pt idx="86">2</cx:pt>
+          <cx:pt idx="87">2</cx:pt>
+          <cx:pt idx="88">1</cx:pt>
+          <cx:pt idx="89">1</cx:pt>
+          <cx:pt idx="90">1</cx:pt>
+        </cx:lvl>
+      </cx:numDim>
+    </cx:data>
+  </cx:chartData>
+  <cx:chart>
+    <cx:title pos="t" align="ctr" overlay="0">
+      <cx:tx>
+        <cx:txData>
+          <cx:v>Database Overview                xxxxx</cx:v>
+        </cx:txData>
+      </cx:tx>
+      <cx:txPr>
+        <a:bodyPr spcFirstLastPara="1" vertOverflow="ellipsis" horzOverflow="overflow" wrap="square" lIns="0" tIns="0" rIns="0" bIns="0" anchor="ctr" anchorCtr="1"/>
+        <a:lstStyle/>
+        <a:p>
+          <a:pPr algn="ctr" rtl="0">
+            <a:defRPr>
+              <a:latin typeface="Courier New" panose="02070309020205020404" pitchFamily="49" charset="0"/>
+              <a:ea typeface="Courier New" panose="02070309020205020404" pitchFamily="49" charset="0"/>
+              <a:cs typeface="Courier New" panose="02070309020205020404" pitchFamily="49" charset="0"/>
+            </a:defRPr>
+          </a:pPr>
+          <a:r>
+            <a:rPr lang="en-US" sz="1400" b="0" i="0" u="none" strike="noStrike" baseline="0">
+              <a:solidFill>
+                <a:sysClr val="windowText" lastClr="000000">
+                  <a:lumMod val="65000"/>
+                  <a:lumOff val="35000"/>
+                </a:sysClr>
+              </a:solidFill>
+              <a:latin typeface="Courier New" panose="02070309020205020404" pitchFamily="49" charset="0"/>
+              <a:cs typeface="Courier New" panose="02070309020205020404" pitchFamily="49" charset="0"/>
+            </a:rPr>
+            <a:t>Database Overview                xxxxx</a:t>
+          </a:r>
+        </a:p>
+      </cx:txPr>
+    </cx:title>
+    <cx:plotArea>
+      <cx:plotAreaRegion>
+        <cx:series layoutId="treemap" uniqueId="{EAFD5683-0E68-4A48-A7E0-C3568D4DFB02}">
+          <cx:dataLabels>
+            <cx:visibility seriesName="0" categoryName="1" value="0"/>
+            <cx:separator>, </cx:separator>
+          </cx:dataLabels>
+          <cx:dataId val="0"/>
+          <cx:layoutPr>
+            <cx:parentLabelLayout val="overlapping"/>
+          </cx:layoutPr>
+        </cx:series>
+      </cx:plotAreaRegion>
+    </cx:plotArea>
+  </cx:chart>
+  <cx:spPr>
+    <a:ln>
+      <a:noFill/>
+    </a:ln>
+  </cx:spPr>
+</cx:chartSpace>
+</file>
+
+<file path=ppt/charts/colors1.xml><?xml version="1.0" encoding="utf-8"?>
+<cs:colorStyle xmlns:cs="http://schemas.microsoft.com/office/drawing/2012/chartStyle" xmlns:a="http://schemas.openxmlformats.org/drawingml/2006/main" meth="cycle" id="10">
+  <a:schemeClr val="accent1"/>
+  <a:schemeClr val="accent2"/>
+  <a:schemeClr val="accent3"/>
+  <a:schemeClr val="accent4"/>
+  <a:schemeClr val="accent5"/>
+  <a:schemeClr val="accent6"/>
+  <cs:variation/>
+  <cs:variation>
+    <a:lumMod val="60000"/>
+  </cs:variation>
+  <cs:variation>
+    <a:lumMod val="80000"/>
+    <a:lumOff val="20000"/>
+  </cs:variation>
+  <cs:variation>
+    <a:lumMod val="80000"/>
+  </cs:variation>
+  <cs:variation>
+    <a:lumMod val="60000"/>
+    <a:lumOff val="40000"/>
+  </cs:variation>
+  <cs:variation>
+    <a:lumMod val="50000"/>
+  </cs:variation>
+  <cs:variation>
+    <a:lumMod val="70000"/>
+    <a:lumOff val="30000"/>
+  </cs:variation>
+  <cs:variation>
+    <a:lumMod val="70000"/>
+  </cs:variation>
+  <cs:variation>
+    <a:lumMod val="50000"/>
+    <a:lumOff val="50000"/>
+  </cs:variation>
+</cs:colorStyle>
+</file>
+
+<file path=ppt/charts/colors2.xml><?xml version="1.0" encoding="utf-8"?>
+<cs:colorStyle xmlns:cs="http://schemas.microsoft.com/office/drawing/2012/chartStyle" xmlns:a="http://schemas.openxmlformats.org/drawingml/2006/main" meth="cycle" id="10">
+  <a:schemeClr val="accent1"/>
+  <a:schemeClr val="accent2"/>
+  <a:schemeClr val="accent3"/>
+  <a:schemeClr val="accent4"/>
+  <a:schemeClr val="accent5"/>
+  <a:schemeClr val="accent6"/>
+  <cs:variation/>
+  <cs:variation>
+    <a:lumMod val="60000"/>
+  </cs:variation>
+  <cs:variation>
+    <a:lumMod val="80000"/>
+    <a:lumOff val="20000"/>
+  </cs:variation>
+  <cs:variation>
+    <a:lumMod val="80000"/>
+  </cs:variation>
+  <cs:variation>
+    <a:lumMod val="60000"/>
+    <a:lumOff val="40000"/>
+  </cs:variation>
+  <cs:variation>
+    <a:lumMod val="50000"/>
+  </cs:variation>
+  <cs:variation>
+    <a:lumMod val="70000"/>
+    <a:lumOff val="30000"/>
+  </cs:variation>
+  <cs:variation>
+    <a:lumMod val="70000"/>
+  </cs:variation>
+  <cs:variation>
+    <a:lumMod val="50000"/>
+    <a:lumOff val="50000"/>
+  </cs:variation>
+</cs:colorStyle>
+</file>
+
+<file path=ppt/charts/style1.xml><?xml version="1.0" encoding="utf-8"?>
+<cs:chartStyle xmlns:cs="http://schemas.microsoft.com/office/drawing/2012/chartStyle" xmlns:a="http://schemas.openxmlformats.org/drawingml/2006/main" id="411">
+  <cs:axisTitle>
+    <cs:lnRef idx="0"/>
+    <cs:fillRef idx="0"/>
+    <cs:effectRef idx="0"/>
+    <cs:fontRef idx="minor">
+      <a:schemeClr val="dk1">
+        <a:lumMod val="75000"/>
+        <a:lumOff val="25000"/>
+      </a:schemeClr>
+    </cs:fontRef>
+    <cs:spPr>
+      <a:solidFill>
+        <a:schemeClr val="bg1">
+          <a:lumMod val="65000"/>
+        </a:schemeClr>
+      </a:solidFill>
+      <a:ln>
+        <a:solidFill>
+          <a:schemeClr val="bg1"/>
+        </a:solidFill>
+      </a:ln>
+    </cs:spPr>
+    <cs:defRPr sz="900"/>
+  </cs:axisTitle>
+  <cs:categoryAxis>
+    <cs:lnRef idx="0"/>
+    <cs:fillRef idx="0"/>
+    <cs:effectRef idx="0"/>
+    <cs:fontRef idx="minor">
+      <a:schemeClr val="dk1">
+        <a:lumMod val="75000"/>
+        <a:lumOff val="25000"/>
+      </a:schemeClr>
+    </cs:fontRef>
+    <cs:spPr>
+      <a:ln w="19050" cap="flat" cmpd="sng" algn="ctr">
+        <a:solidFill>
+          <a:schemeClr val="dk1">
+            <a:lumMod val="75000"/>
+            <a:lumOff val="25000"/>
+          </a:schemeClr>
+        </a:solidFill>
+        <a:round/>
+      </a:ln>
+    </cs:spPr>
+    <cs:defRPr sz="900"/>
+  </cs:categoryAxis>
+  <cs:chartArea>
+    <cs:lnRef idx="0"/>
+    <cs:fillRef idx="0"/>
+    <cs:effectRef idx="0"/>
+    <cs:fontRef idx="minor">
+      <a:schemeClr val="dk1"/>
+    </cs:fontRef>
+    <cs:spPr>
+      <a:gradFill flip="none" rotWithShape="1">
+        <a:gsLst>
+          <a:gs pos="0">
+            <a:schemeClr val="lt1"/>
+          </a:gs>
+          <a:gs pos="39000">
+            <a:schemeClr val="lt1"/>
+          </a:gs>
+          <a:gs pos="100000">
+            <a:schemeClr val="lt1">
+              <a:lumMod val="75000"/>
+            </a:schemeClr>
+          </a:gs>
+        </a:gsLst>
+        <a:path path="circle">
+          <a:fillToRect l="50000" t="-80000" r="50000" b="180000"/>
+        </a:path>
+        <a:tileRect/>
+      </a:gradFill>
+      <a:ln w="9525" cap="flat" cmpd="sng" algn="ctr">
+        <a:solidFill>
+          <a:schemeClr val="dk1">
+            <a:lumMod val="25000"/>
+            <a:lumOff val="75000"/>
+          </a:schemeClr>
+        </a:solidFill>
+        <a:round/>
+      </a:ln>
+    </cs:spPr>
+    <cs:defRPr sz="900"/>
+  </cs:chartArea>
+  <cs:dataLabel>
+    <cs:lnRef idx="0"/>
+    <cs:fillRef idx="0"/>
+    <cs:effectRef idx="0"/>
+    <cs:fontRef idx="minor">
+      <a:schemeClr val="lt1"/>
+    </cs:fontRef>
+    <cs:defRPr sz="900"/>
+  </cs:dataLabel>
+  <cs:dataLabelCallout>
+    <cs:lnRef idx="0"/>
+    <cs:fillRef idx="0"/>
+    <cs:effectRef idx="0"/>
+    <cs:fontRef idx="minor">
+      <a:schemeClr val="lt1"/>
+    </cs:fontRef>
+    <cs:spPr>
+      <a:solidFill>
+        <a:schemeClr val="dk1">
+          <a:lumMod val="65000"/>
+          <a:lumOff val="35000"/>
+          <a:alpha val="75000"/>
+        </a:schemeClr>
+      </a:solidFill>
+    </cs:spPr>
+    <cs:defRPr sz="900"/>
+    <cs:bodyPr rot="0" spcFirstLastPara="1" vertOverflow="clip" horzOverflow="clip" vert="horz" wrap="square" lIns="36576" tIns="18288" rIns="36576" bIns="18288" anchor="ctr" anchorCtr="1">
+      <a:spAutoFit/>
+    </cs:bodyPr>
+  </cs:dataLabelCallout>
+  <cs:dataPoint>
+    <cs:lnRef idx="0"/>
+    <cs:fillRef idx="0">
+      <cs:styleClr val="auto"/>
+    </cs:fillRef>
+    <cs:effectRef idx="0"/>
+    <cs:fontRef idx="minor">
+      <a:schemeClr val="dk1"/>
+    </cs:fontRef>
+    <cs:spPr>
+      <a:solidFill>
+        <a:schemeClr val="phClr"/>
+      </a:solidFill>
+      <a:ln>
+        <a:solidFill>
+          <a:schemeClr val="lt1"/>
+        </a:solidFill>
+      </a:ln>
+    </cs:spPr>
+  </cs:dataPoint>
+  <cs:dataPoint3D>
+    <cs:lnRef idx="0"/>
+    <cs:fillRef idx="0">
+      <cs:styleClr val="auto"/>
+    </cs:fillRef>
+    <cs:effectRef idx="0"/>
+    <cs:fontRef idx="minor">
+      <a:schemeClr val="dk1"/>
+    </cs:fontRef>
+    <cs:spPr>
+      <a:solidFill>
+        <a:schemeClr val="phClr"/>
+      </a:solidFill>
+      <a:ln w="9525" cap="flat" cmpd="sng" algn="ctr">
+        <a:solidFill>
+          <a:schemeClr val="lt1">
+            <a:alpha val="50000"/>
+          </a:schemeClr>
+        </a:solidFill>
+        <a:round/>
+      </a:ln>
+    </cs:spPr>
+  </cs:dataPoint3D>
+  <cs:dataPointLine>
+    <cs:lnRef idx="0">
+      <cs:styleClr val="auto"/>
+    </cs:lnRef>
+    <cs:fillRef idx="0"/>
+    <cs:effectRef idx="0"/>
+    <cs:fontRef idx="minor">
+      <a:schemeClr val="dk1"/>
+    </cs:fontRef>
+    <cs:spPr>
+      <a:ln w="28575" cap="rnd">
+        <a:solidFill>
+          <a:schemeClr val="phClr"/>
+        </a:solidFill>
+        <a:round/>
+      </a:ln>
+    </cs:spPr>
+  </cs:dataPointLine>
+  <cs:dataPointMarker>
+    <cs:lnRef idx="0"/>
+    <cs:fillRef idx="0">
+      <cs:styleClr val="auto"/>
+    </cs:fillRef>
+    <cs:effectRef idx="0"/>
+    <cs:fontRef idx="minor">
+      <a:schemeClr val="dk1"/>
+    </cs:fontRef>
+    <cs:spPr>
+      <a:solidFill>
+        <a:schemeClr val="phClr"/>
+      </a:solidFill>
+      <a:ln w="9525">
+        <a:solidFill>
+          <a:schemeClr val="lt1"/>
+        </a:solidFill>
+      </a:ln>
+    </cs:spPr>
+  </cs:dataPointMarker>
+  <cs:dataPointMarkerLayout symbol="circle" size="6"/>
+  <cs:dataPointWireframe>
+    <cs:lnRef idx="0">
+      <cs:styleClr val="auto"/>
+    </cs:lnRef>
+    <cs:fillRef idx="0"/>
+    <cs:effectRef idx="0"/>
+    <cs:fontRef idx="minor">
+      <a:schemeClr val="dk1"/>
+    </cs:fontRef>
+    <cs:spPr>
+      <a:ln w="28575" cap="rnd">
+        <a:solidFill>
+          <a:schemeClr val="phClr"/>
+        </a:solidFill>
+        <a:round/>
+      </a:ln>
+    </cs:spPr>
+  </cs:dataPointWireframe>
+  <cs:dataTable>
+    <cs:lnRef idx="0"/>
+    <cs:fillRef idx="0"/>
+    <cs:effectRef idx="0"/>
+    <cs:fontRef idx="minor">
+      <a:schemeClr val="dk1">
+        <a:lumMod val="75000"/>
+        <a:lumOff val="25000"/>
+      </a:schemeClr>
+    </cs:fontRef>
+    <cs:spPr>
+      <a:ln w="9525">
+        <a:solidFill>
+          <a:schemeClr val="dk1">
+            <a:lumMod val="75000"/>
+            <a:lumOff val="25000"/>
+          </a:schemeClr>
+        </a:solidFill>
+      </a:ln>
+    </cs:spPr>
+    <cs:defRPr sz="900"/>
+  </cs:dataTable>
+  <cs:downBar>
+    <cs:lnRef idx="0"/>
+    <cs:fillRef idx="0"/>
+    <cs:effectRef idx="0"/>
+    <cs:fontRef idx="minor">
+      <a:schemeClr val="dk1"/>
+    </cs:fontRef>
+    <cs:spPr>
+      <a:solidFill>
+        <a:schemeClr val="dk1">
+          <a:lumMod val="50000"/>
+          <a:lumOff val="50000"/>
+        </a:schemeClr>
+      </a:solidFill>
+      <a:ln w="9525">
+        <a:solidFill>
+          <a:schemeClr val="dk1">
+            <a:lumMod val="65000"/>
+            <a:lumOff val="35000"/>
+          </a:schemeClr>
+        </a:solidFill>
+      </a:ln>
+    </cs:spPr>
+  </cs:downBar>
+  <cs:dropLine>
+    <cs:lnRef idx="0"/>
+    <cs:fillRef idx="0"/>
+    <cs:effectRef idx="0"/>
+    <cs:fontRef idx="minor">
+      <a:schemeClr val="dk1"/>
+    </cs:fontRef>
+    <cs:spPr>
+      <a:ln w="9525">
+        <a:solidFill>
+          <a:schemeClr val="dk1">
+            <a:lumMod val="35000"/>
+            <a:lumOff val="65000"/>
+          </a:schemeClr>
+        </a:solidFill>
+        <a:prstDash val="dash"/>
+      </a:ln>
+    </cs:spPr>
+  </cs:dropLine>
+  <cs:errorBar>
+    <cs:lnRef idx="0"/>
+    <cs:fillRef idx="0"/>
+    <cs:effectRef idx="0"/>
+    <cs:fontRef idx="minor">
+      <a:schemeClr val="tx1"/>
+    </cs:fontRef>
+    <cs:spPr>
+      <a:ln w="9525" cap="flat" cmpd="sng" algn="ctr">
+        <a:solidFill>
+          <a:schemeClr val="tx1">
+            <a:lumMod val="65000"/>
+            <a:lumOff val="35000"/>
+          </a:schemeClr>
+        </a:solidFill>
+        <a:round/>
+      </a:ln>
+    </cs:spPr>
+  </cs:errorBar>
+  <cs:floor>
+    <cs:lnRef idx="0"/>
+    <cs:fillRef idx="0"/>
+    <cs:effectRef idx="0"/>
+    <cs:fontRef idx="minor">
+      <a:schemeClr val="dk1"/>
+    </cs:fontRef>
+  </cs:floor>
+  <cs:gridlineMajor>
+    <cs:lnRef idx="0"/>
+    <cs:fillRef idx="0"/>
+    <cs:effectRef idx="0"/>
+    <cs:fontRef idx="minor">
+      <a:schemeClr val="dk1"/>
+    </cs:fontRef>
+    <cs:spPr>
+      <a:ln w="9525" cap="flat" cmpd="sng" algn="ctr">
+        <a:gradFill>
+          <a:gsLst>
+            <a:gs pos="100000">
+              <a:schemeClr val="dk1">
+                <a:lumMod val="95000"/>
+                <a:lumOff val="5000"/>
+                <a:alpha val="42000"/>
+              </a:schemeClr>
+            </a:gs>
+            <a:gs pos="0">
+              <a:schemeClr val="lt1">
+                <a:lumMod val="75000"/>
+                <a:alpha val="36000"/>
+              </a:schemeClr>
+            </a:gs>
+          </a:gsLst>
+          <a:lin ang="5400000" scaled="0"/>
+        </a:gradFill>
+        <a:round/>
+      </a:ln>
+    </cs:spPr>
+  </cs:gridlineMajor>
+  <cs:gridlineMinor>
+    <cs:lnRef idx="0"/>
+    <cs:fillRef idx="0"/>
+    <cs:effectRef idx="0"/>
+    <cs:fontRef idx="minor">
+      <a:schemeClr val="dk1"/>
+    </cs:fontRef>
+    <cs:spPr>
+      <a:ln>
+        <a:gradFill>
+          <a:gsLst>
+            <a:gs pos="100000">
+              <a:schemeClr val="dk1">
+                <a:lumMod val="95000"/>
+                <a:lumOff val="5000"/>
+                <a:alpha val="42000"/>
+                <a:lumOff val="10000"/>
+              </a:schemeClr>
+            </a:gs>
+            <a:gs pos="0">
+              <a:schemeClr val="lt1">
+                <a:lumMod val="75000"/>
+                <a:alpha val="36000"/>
+                <a:lumOff val="10000"/>
+              </a:schemeClr>
+            </a:gs>
+          </a:gsLst>
+          <a:lin ang="5400000" scaled="0"/>
+        </a:gradFill>
+      </a:ln>
+    </cs:spPr>
+  </cs:gridlineMinor>
+  <cs:hiLoLine>
+    <cs:lnRef idx="0"/>
+    <cs:fillRef idx="0"/>
+    <cs:effectRef idx="0"/>
+    <cs:fontRef idx="minor">
+      <a:schemeClr val="dk1"/>
+    </cs:fontRef>
+    <cs:spPr>
+      <a:ln w="9525">
+        <a:solidFill>
+          <a:schemeClr val="dk1">
+            <a:lumMod val="35000"/>
+            <a:lumOff val="65000"/>
+          </a:schemeClr>
+        </a:solidFill>
+        <a:prstDash val="dash"/>
+      </a:ln>
+    </cs:spPr>
+  </cs:hiLoLine>
+  <cs:leaderLine>
+    <cs:lnRef idx="0"/>
+    <cs:fillRef idx="0"/>
+    <cs:effectRef idx="0"/>
+    <cs:fontRef idx="minor">
+      <a:schemeClr val="dk1"/>
+    </cs:fontRef>
+    <cs:spPr>
+      <a:ln w="9525" cap="flat" cmpd="sng" algn="ctr">
+        <a:solidFill>
+          <a:schemeClr val="dk1">
+            <a:lumMod val="35000"/>
+            <a:lumOff val="65000"/>
+          </a:schemeClr>
+        </a:solidFill>
+        <a:round/>
+      </a:ln>
+    </cs:spPr>
+  </cs:leaderLine>
+  <cs:legend>
+    <cs:lnRef idx="0"/>
+    <cs:fillRef idx="0"/>
+    <cs:effectRef idx="0"/>
+    <cs:fontRef idx="minor">
+      <a:schemeClr val="dk1">
+        <a:lumMod val="75000"/>
+        <a:lumOff val="25000"/>
+      </a:schemeClr>
+    </cs:fontRef>
+    <cs:spPr>
+      <a:solidFill>
+        <a:schemeClr val="lt1">
+          <a:lumMod val="95000"/>
+          <a:alpha val="39000"/>
+        </a:schemeClr>
+      </a:solidFill>
+    </cs:spPr>
+    <cs:defRPr sz="900"/>
+  </cs:legend>
+  <cs:plotArea>
+    <cs:lnRef idx="0"/>
+    <cs:fillRef idx="0"/>
+    <cs:effectRef idx="0"/>
+    <cs:fontRef idx="minor">
+      <a:schemeClr val="dk1"/>
+    </cs:fontRef>
+  </cs:plotArea>
+  <cs:plotArea3D>
+    <cs:lnRef idx="0"/>
+    <cs:fillRef idx="0"/>
+    <cs:effectRef idx="0"/>
+    <cs:fontRef idx="minor">
+      <a:schemeClr val="dk1"/>
+    </cs:fontRef>
+  </cs:plotArea3D>
+  <cs:seriesAxis>
+    <cs:lnRef idx="0"/>
+    <cs:fillRef idx="0"/>
+    <cs:effectRef idx="0"/>
+    <cs:fontRef idx="minor">
+      <a:schemeClr val="dk1">
+        <a:lumMod val="75000"/>
+        <a:lumOff val="25000"/>
+      </a:schemeClr>
+    </cs:fontRef>
+    <cs:spPr>
+      <a:ln w="19050" cap="flat" cmpd="sng" algn="ctr">
+        <a:solidFill>
+          <a:schemeClr val="dk1">
+            <a:lumMod val="75000"/>
+            <a:lumOff val="25000"/>
+          </a:schemeClr>
+        </a:solidFill>
+        <a:round/>
+      </a:ln>
+    </cs:spPr>
+    <cs:defRPr sz="900"/>
+  </cs:seriesAxis>
+  <cs:seriesLine>
+    <cs:lnRef idx="0"/>
+    <cs:fillRef idx="0"/>
+    <cs:effectRef idx="0"/>
+    <cs:fontRef idx="minor">
+      <a:schemeClr val="dk1"/>
+    </cs:fontRef>
+    <cs:spPr>
+      <a:ln w="9525" cap="flat">
+        <a:solidFill>
+          <a:schemeClr val="bg1">
+            <a:lumMod val="50000"/>
+          </a:schemeClr>
+        </a:solidFill>
+        <a:round/>
+      </a:ln>
+    </cs:spPr>
+  </cs:seriesLine>
+  <cs:title>
+    <cs:lnRef idx="0"/>
+    <cs:fillRef idx="0"/>
+    <cs:effectRef idx="0"/>
+    <cs:fontRef idx="minor">
+      <a:schemeClr val="dk1">
+        <a:lumMod val="75000"/>
+        <a:lumOff val="25000"/>
+      </a:schemeClr>
+    </cs:fontRef>
+    <cs:defRPr sz="1800" b="1"/>
+  </cs:title>
+  <cs:trendline>
+    <cs:lnRef idx="0"/>
+    <cs:fillRef idx="0"/>
+    <cs:effectRef idx="0"/>
+    <cs:fontRef idx="minor">
+      <a:schemeClr val="dk1"/>
+    </cs:fontRef>
+    <cs:spPr>
+      <a:ln w="19050" cap="rnd">
+        <a:solidFill>
+          <a:schemeClr val="phClr"/>
+        </a:solidFill>
+        <a:prstDash val="sysDash"/>
+      </a:ln>
+    </cs:spPr>
+  </cs:trendline>
+  <cs:trendlineLabel>
+    <cs:lnRef idx="0"/>
+    <cs:fillRef idx="0"/>
+    <cs:effectRef idx="0"/>
+    <cs:fontRef idx="minor">
+      <a:schemeClr val="dk1">
+        <a:lumMod val="75000"/>
+        <a:lumOff val="25000"/>
+      </a:schemeClr>
+    </cs:fontRef>
+    <cs:defRPr sz="900"/>
+  </cs:trendlineLabel>
+  <cs:upBar>
+    <cs:lnRef idx="0"/>
+    <cs:fillRef idx="0"/>
+    <cs:effectRef idx="0"/>
+    <cs:fontRef idx="minor">
+      <a:schemeClr val="dk1"/>
+    </cs:fontRef>
+    <cs:spPr>
+      <a:solidFill>
+        <a:schemeClr val="lt1"/>
+      </a:solidFill>
+      <a:ln w="9525">
+        <a:solidFill>
+          <a:schemeClr val="dk1">
+            <a:lumMod val="65000"/>
+            <a:lumOff val="35000"/>
+          </a:schemeClr>
+        </a:solidFill>
+      </a:ln>
+    </cs:spPr>
+  </cs:upBar>
+  <cs:valueAxis>
+    <cs:lnRef idx="0"/>
+    <cs:fillRef idx="0"/>
+    <cs:effectRef idx="0"/>
+    <cs:fontRef idx="minor">
+      <a:schemeClr val="dk1">
+        <a:lumMod val="75000"/>
+        <a:lumOff val="25000"/>
+      </a:schemeClr>
+    </cs:fontRef>
+    <cs:defRPr sz="900"/>
+  </cs:valueAxis>
+  <cs:wall>
+    <cs:lnRef idx="0"/>
+    <cs:fillRef idx="0"/>
+    <cs:effectRef idx="0"/>
+    <cs:fontRef idx="minor">
+      <a:schemeClr val="dk1"/>
+    </cs:fontRef>
+  </cs:wall>
+</cs:chartStyle>
+</file>
+
+<file path=ppt/charts/style2.xml><?xml version="1.0" encoding="utf-8"?>
+<cs:chartStyle xmlns:cs="http://schemas.microsoft.com/office/drawing/2012/chartStyle" xmlns:a="http://schemas.openxmlformats.org/drawingml/2006/main" id="411">
+  <cs:axisTitle>
+    <cs:lnRef idx="0"/>
+    <cs:fillRef idx="0"/>
+    <cs:effectRef idx="0"/>
+    <cs:fontRef idx="minor">
+      <a:schemeClr val="dk1">
+        <a:lumMod val="75000"/>
+        <a:lumOff val="25000"/>
+      </a:schemeClr>
+    </cs:fontRef>
+    <cs:spPr>
+      <a:solidFill>
+        <a:schemeClr val="bg1">
+          <a:lumMod val="65000"/>
+        </a:schemeClr>
+      </a:solidFill>
+      <a:ln>
+        <a:solidFill>
+          <a:schemeClr val="bg1"/>
+        </a:solidFill>
+      </a:ln>
+    </cs:spPr>
+    <cs:defRPr sz="900"/>
+  </cs:axisTitle>
+  <cs:categoryAxis>
+    <cs:lnRef idx="0"/>
+    <cs:fillRef idx="0"/>
+    <cs:effectRef idx="0"/>
+    <cs:fontRef idx="minor">
+      <a:schemeClr val="dk1">
+        <a:lumMod val="75000"/>
+        <a:lumOff val="25000"/>
+      </a:schemeClr>
+    </cs:fontRef>
+    <cs:spPr>
+      <a:ln w="19050" cap="flat" cmpd="sng" algn="ctr">
+        <a:solidFill>
+          <a:schemeClr val="dk1">
+            <a:lumMod val="75000"/>
+            <a:lumOff val="25000"/>
+          </a:schemeClr>
+        </a:solidFill>
+        <a:round/>
+      </a:ln>
+    </cs:spPr>
+    <cs:defRPr sz="900"/>
+  </cs:categoryAxis>
+  <cs:chartArea>
+    <cs:lnRef idx="0"/>
+    <cs:fillRef idx="0"/>
+    <cs:effectRef idx="0"/>
+    <cs:fontRef idx="minor">
+      <a:schemeClr val="dk1"/>
+    </cs:fontRef>
+    <cs:spPr>
+      <a:gradFill flip="none" rotWithShape="1">
+        <a:gsLst>
+          <a:gs pos="0">
+            <a:schemeClr val="lt1"/>
+          </a:gs>
+          <a:gs pos="39000">
+            <a:schemeClr val="lt1"/>
+          </a:gs>
+          <a:gs pos="100000">
+            <a:schemeClr val="lt1">
+              <a:lumMod val="75000"/>
+            </a:schemeClr>
+          </a:gs>
+        </a:gsLst>
+        <a:path path="circle">
+          <a:fillToRect l="50000" t="-80000" r="50000" b="180000"/>
+        </a:path>
+        <a:tileRect/>
+      </a:gradFill>
+      <a:ln w="9525" cap="flat" cmpd="sng" algn="ctr">
+        <a:solidFill>
+          <a:schemeClr val="dk1">
+            <a:lumMod val="25000"/>
+            <a:lumOff val="75000"/>
+          </a:schemeClr>
+        </a:solidFill>
+        <a:round/>
+      </a:ln>
+    </cs:spPr>
+    <cs:defRPr sz="900"/>
+  </cs:chartArea>
+  <cs:dataLabel>
+    <cs:lnRef idx="0"/>
+    <cs:fillRef idx="0"/>
+    <cs:effectRef idx="0"/>
+    <cs:fontRef idx="minor">
+      <a:schemeClr val="lt1"/>
+    </cs:fontRef>
+    <cs:defRPr sz="900"/>
+  </cs:dataLabel>
+  <cs:dataLabelCallout>
+    <cs:lnRef idx="0"/>
+    <cs:fillRef idx="0"/>
+    <cs:effectRef idx="0"/>
+    <cs:fontRef idx="minor">
+      <a:schemeClr val="lt1"/>
+    </cs:fontRef>
+    <cs:spPr>
+      <a:solidFill>
+        <a:schemeClr val="dk1">
+          <a:lumMod val="65000"/>
+          <a:lumOff val="35000"/>
+          <a:alpha val="75000"/>
+        </a:schemeClr>
+      </a:solidFill>
+    </cs:spPr>
+    <cs:defRPr sz="900"/>
+    <cs:bodyPr rot="0" spcFirstLastPara="1" vertOverflow="clip" horzOverflow="clip" vert="horz" wrap="square" lIns="36576" tIns="18288" rIns="36576" bIns="18288" anchor="ctr" anchorCtr="1">
+      <a:spAutoFit/>
+    </cs:bodyPr>
+  </cs:dataLabelCallout>
+  <cs:dataPoint>
+    <cs:lnRef idx="0"/>
+    <cs:fillRef idx="0">
+      <cs:styleClr val="auto"/>
+    </cs:fillRef>
+    <cs:effectRef idx="0"/>
+    <cs:fontRef idx="minor">
+      <a:schemeClr val="dk1"/>
+    </cs:fontRef>
+    <cs:spPr>
+      <a:solidFill>
+        <a:schemeClr val="phClr"/>
+      </a:solidFill>
+      <a:ln>
+        <a:solidFill>
+          <a:schemeClr val="lt1"/>
+        </a:solidFill>
+      </a:ln>
+    </cs:spPr>
+  </cs:dataPoint>
+  <cs:dataPoint3D>
+    <cs:lnRef idx="0"/>
+    <cs:fillRef idx="0">
+      <cs:styleClr val="auto"/>
+    </cs:fillRef>
+    <cs:effectRef idx="0"/>
+    <cs:fontRef idx="minor">
+      <a:schemeClr val="dk1"/>
+    </cs:fontRef>
+    <cs:spPr>
+      <a:solidFill>
+        <a:schemeClr val="phClr"/>
+      </a:solidFill>
+      <a:ln w="9525" cap="flat" cmpd="sng" algn="ctr">
+        <a:solidFill>
+          <a:schemeClr val="lt1">
+            <a:alpha val="50000"/>
+          </a:schemeClr>
+        </a:solidFill>
+        <a:round/>
+      </a:ln>
+    </cs:spPr>
+  </cs:dataPoint3D>
+  <cs:dataPointLine>
+    <cs:lnRef idx="0">
+      <cs:styleClr val="auto"/>
+    </cs:lnRef>
+    <cs:fillRef idx="0"/>
+    <cs:effectRef idx="0"/>
+    <cs:fontRef idx="minor">
+      <a:schemeClr val="dk1"/>
+    </cs:fontRef>
+    <cs:spPr>
+      <a:ln w="28575" cap="rnd">
+        <a:solidFill>
+          <a:schemeClr val="phClr"/>
+        </a:solidFill>
+        <a:round/>
+      </a:ln>
+    </cs:spPr>
+  </cs:dataPointLine>
+  <cs:dataPointMarker>
+    <cs:lnRef idx="0"/>
+    <cs:fillRef idx="0">
+      <cs:styleClr val="auto"/>
+    </cs:fillRef>
+    <cs:effectRef idx="0"/>
+    <cs:fontRef idx="minor">
+      <a:schemeClr val="dk1"/>
+    </cs:fontRef>
+    <cs:spPr>
+      <a:solidFill>
+        <a:schemeClr val="phClr"/>
+      </a:solidFill>
+      <a:ln w="9525">
+        <a:solidFill>
+          <a:schemeClr val="lt1"/>
+        </a:solidFill>
+      </a:ln>
+    </cs:spPr>
+  </cs:dataPointMarker>
+  <cs:dataPointMarkerLayout symbol="circle" size="6"/>
+  <cs:dataPointWireframe>
+    <cs:lnRef idx="0">
+      <cs:styleClr val="auto"/>
+    </cs:lnRef>
+    <cs:fillRef idx="0"/>
+    <cs:effectRef idx="0"/>
+    <cs:fontRef idx="minor">
+      <a:schemeClr val="dk1"/>
+    </cs:fontRef>
+    <cs:spPr>
+      <a:ln w="28575" cap="rnd">
+        <a:solidFill>
+          <a:schemeClr val="phClr"/>
+        </a:solidFill>
+        <a:round/>
+      </a:ln>
+    </cs:spPr>
+  </cs:dataPointWireframe>
+  <cs:dataTable>
+    <cs:lnRef idx="0"/>
+    <cs:fillRef idx="0"/>
+    <cs:effectRef idx="0"/>
+    <cs:fontRef idx="minor">
+      <a:schemeClr val="dk1">
+        <a:lumMod val="75000"/>
+        <a:lumOff val="25000"/>
+      </a:schemeClr>
+    </cs:fontRef>
+    <cs:spPr>
+      <a:ln w="9525">
+        <a:solidFill>
+          <a:schemeClr val="dk1">
+            <a:lumMod val="75000"/>
+            <a:lumOff val="25000"/>
+          </a:schemeClr>
+        </a:solidFill>
+      </a:ln>
+    </cs:spPr>
+    <cs:defRPr sz="900"/>
+  </cs:dataTable>
+  <cs:downBar>
+    <cs:lnRef idx="0"/>
+    <cs:fillRef idx="0"/>
+    <cs:effectRef idx="0"/>
+    <cs:fontRef idx="minor">
+      <a:schemeClr val="dk1"/>
+    </cs:fontRef>
+    <cs:spPr>
+      <a:solidFill>
+        <a:schemeClr val="dk1">
+          <a:lumMod val="50000"/>
+          <a:lumOff val="50000"/>
+        </a:schemeClr>
+      </a:solidFill>
+      <a:ln w="9525">
+        <a:solidFill>
+          <a:schemeClr val="dk1">
+            <a:lumMod val="65000"/>
+            <a:lumOff val="35000"/>
+          </a:schemeClr>
+        </a:solidFill>
+      </a:ln>
+    </cs:spPr>
+  </cs:downBar>
+  <cs:dropLine>
+    <cs:lnRef idx="0"/>
+    <cs:fillRef idx="0"/>
+    <cs:effectRef idx="0"/>
+    <cs:fontRef idx="minor">
+      <a:schemeClr val="dk1"/>
+    </cs:fontRef>
+    <cs:spPr>
+      <a:ln w="9525">
+        <a:solidFill>
+          <a:schemeClr val="dk1">
+            <a:lumMod val="35000"/>
+            <a:lumOff val="65000"/>
+          </a:schemeClr>
+        </a:solidFill>
+        <a:prstDash val="dash"/>
+      </a:ln>
+    </cs:spPr>
+  </cs:dropLine>
+  <cs:errorBar>
+    <cs:lnRef idx="0"/>
+    <cs:fillRef idx="0"/>
+    <cs:effectRef idx="0"/>
+    <cs:fontRef idx="minor">
+      <a:schemeClr val="tx1"/>
+    </cs:fontRef>
+    <cs:spPr>
+      <a:ln w="9525" cap="flat" cmpd="sng" algn="ctr">
+        <a:solidFill>
+          <a:schemeClr val="tx1">
+            <a:lumMod val="65000"/>
+            <a:lumOff val="35000"/>
+          </a:schemeClr>
+        </a:solidFill>
+        <a:round/>
+      </a:ln>
+    </cs:spPr>
+  </cs:errorBar>
+  <cs:floor>
+    <cs:lnRef idx="0"/>
+    <cs:fillRef idx="0"/>
+    <cs:effectRef idx="0"/>
+    <cs:fontRef idx="minor">
+      <a:schemeClr val="dk1"/>
+    </cs:fontRef>
+  </cs:floor>
+  <cs:gridlineMajor>
+    <cs:lnRef idx="0"/>
+    <cs:fillRef idx="0"/>
+    <cs:effectRef idx="0"/>
+    <cs:fontRef idx="minor">
+      <a:schemeClr val="dk1"/>
+    </cs:fontRef>
+    <cs:spPr>
+      <a:ln w="9525" cap="flat" cmpd="sng" algn="ctr">
+        <a:gradFill>
+          <a:gsLst>
+            <a:gs pos="100000">
+              <a:schemeClr val="dk1">
+                <a:lumMod val="95000"/>
+                <a:lumOff val="5000"/>
+                <a:alpha val="42000"/>
+              </a:schemeClr>
+            </a:gs>
+            <a:gs pos="0">
+              <a:schemeClr val="lt1">
+                <a:lumMod val="75000"/>
+                <a:alpha val="36000"/>
+              </a:schemeClr>
+            </a:gs>
+          </a:gsLst>
+          <a:lin ang="5400000" scaled="0"/>
+        </a:gradFill>
+        <a:round/>
+      </a:ln>
+    </cs:spPr>
+  </cs:gridlineMajor>
+  <cs:gridlineMinor>
+    <cs:lnRef idx="0"/>
+    <cs:fillRef idx="0"/>
+    <cs:effectRef idx="0"/>
+    <cs:fontRef idx="minor">
+      <a:schemeClr val="dk1"/>
+    </cs:fontRef>
+    <cs:spPr>
+      <a:ln>
+        <a:gradFill>
+          <a:gsLst>
+            <a:gs pos="100000">
+              <a:schemeClr val="dk1">
+                <a:lumMod val="95000"/>
+                <a:lumOff val="5000"/>
+                <a:alpha val="42000"/>
+                <a:lumOff val="10000"/>
+              </a:schemeClr>
+            </a:gs>
+            <a:gs pos="0">
+              <a:schemeClr val="lt1">
+                <a:lumMod val="75000"/>
+                <a:alpha val="36000"/>
+                <a:lumOff val="10000"/>
+              </a:schemeClr>
+            </a:gs>
+          </a:gsLst>
+          <a:lin ang="5400000" scaled="0"/>
+        </a:gradFill>
+      </a:ln>
+    </cs:spPr>
+  </cs:gridlineMinor>
+  <cs:hiLoLine>
+    <cs:lnRef idx="0"/>
+    <cs:fillRef idx="0"/>
+    <cs:effectRef idx="0"/>
+    <cs:fontRef idx="minor">
+      <a:schemeClr val="dk1"/>
+    </cs:fontRef>
+    <cs:spPr>
+      <a:ln w="9525">
+        <a:solidFill>
+          <a:schemeClr val="dk1">
+            <a:lumMod val="35000"/>
+            <a:lumOff val="65000"/>
+          </a:schemeClr>
+        </a:solidFill>
+        <a:prstDash val="dash"/>
+      </a:ln>
+    </cs:spPr>
+  </cs:hiLoLine>
+  <cs:leaderLine>
+    <cs:lnRef idx="0"/>
+    <cs:fillRef idx="0"/>
+    <cs:effectRef idx="0"/>
+    <cs:fontRef idx="minor">
+      <a:schemeClr val="dk1"/>
+    </cs:fontRef>
+    <cs:spPr>
+      <a:ln w="9525" cap="flat" cmpd="sng" algn="ctr">
+        <a:solidFill>
+          <a:schemeClr val="dk1">
+            <a:lumMod val="35000"/>
+            <a:lumOff val="65000"/>
+          </a:schemeClr>
+        </a:solidFill>
+        <a:round/>
+      </a:ln>
+    </cs:spPr>
+  </cs:leaderLine>
+  <cs:legend>
+    <cs:lnRef idx="0"/>
+    <cs:fillRef idx="0"/>
+    <cs:effectRef idx="0"/>
+    <cs:fontRef idx="minor">
+      <a:schemeClr val="dk1">
+        <a:lumMod val="75000"/>
+        <a:lumOff val="25000"/>
+      </a:schemeClr>
+    </cs:fontRef>
+    <cs:spPr>
+      <a:solidFill>
+        <a:schemeClr val="lt1">
+          <a:lumMod val="95000"/>
+          <a:alpha val="39000"/>
+        </a:schemeClr>
+      </a:solidFill>
+    </cs:spPr>
+    <cs:defRPr sz="900"/>
+  </cs:legend>
+  <cs:plotArea>
+    <cs:lnRef idx="0"/>
+    <cs:fillRef idx="0"/>
+    <cs:effectRef idx="0"/>
+    <cs:fontRef idx="minor">
+      <a:schemeClr val="dk1"/>
+    </cs:fontRef>
+  </cs:plotArea>
+  <cs:plotArea3D>
+    <cs:lnRef idx="0"/>
+    <cs:fillRef idx="0"/>
+    <cs:effectRef idx="0"/>
+    <cs:fontRef idx="minor">
+      <a:schemeClr val="dk1"/>
+    </cs:fontRef>
+  </cs:plotArea3D>
+  <cs:seriesAxis>
+    <cs:lnRef idx="0"/>
+    <cs:fillRef idx="0"/>
+    <cs:effectRef idx="0"/>
+    <cs:fontRef idx="minor">
+      <a:schemeClr val="dk1">
+        <a:lumMod val="75000"/>
+        <a:lumOff val="25000"/>
+      </a:schemeClr>
+    </cs:fontRef>
+    <cs:spPr>
+      <a:ln w="19050" cap="flat" cmpd="sng" algn="ctr">
+        <a:solidFill>
+          <a:schemeClr val="dk1">
+            <a:lumMod val="75000"/>
+            <a:lumOff val="25000"/>
+          </a:schemeClr>
+        </a:solidFill>
+        <a:round/>
+      </a:ln>
+    </cs:spPr>
+    <cs:defRPr sz="900"/>
+  </cs:seriesAxis>
+  <cs:seriesLine>
+    <cs:lnRef idx="0"/>
+    <cs:fillRef idx="0"/>
+    <cs:effectRef idx="0"/>
+    <cs:fontRef idx="minor">
+      <a:schemeClr val="dk1"/>
+    </cs:fontRef>
+    <cs:spPr>
+      <a:ln w="9525" cap="flat">
+        <a:solidFill>
+          <a:schemeClr val="bg1">
+            <a:lumMod val="50000"/>
+          </a:schemeClr>
+        </a:solidFill>
+        <a:round/>
+      </a:ln>
+    </cs:spPr>
+  </cs:seriesLine>
+  <cs:title>
+    <cs:lnRef idx="0"/>
+    <cs:fillRef idx="0"/>
+    <cs:effectRef idx="0"/>
+    <cs:fontRef idx="minor">
+      <a:schemeClr val="dk1">
+        <a:lumMod val="75000"/>
+        <a:lumOff val="25000"/>
+      </a:schemeClr>
+    </cs:fontRef>
+    <cs:defRPr sz="1800" b="1"/>
+  </cs:title>
+  <cs:trendline>
+    <cs:lnRef idx="0"/>
+    <cs:fillRef idx="0"/>
+    <cs:effectRef idx="0"/>
+    <cs:fontRef idx="minor">
+      <a:schemeClr val="dk1"/>
+    </cs:fontRef>
+    <cs:spPr>
+      <a:ln w="19050" cap="rnd">
+        <a:solidFill>
+          <a:schemeClr val="phClr"/>
+        </a:solidFill>
+        <a:prstDash val="sysDash"/>
+      </a:ln>
+    </cs:spPr>
+  </cs:trendline>
+  <cs:trendlineLabel>
+    <cs:lnRef idx="0"/>
+    <cs:fillRef idx="0"/>
+    <cs:effectRef idx="0"/>
+    <cs:fontRef idx="minor">
+      <a:schemeClr val="dk1">
+        <a:lumMod val="75000"/>
+        <a:lumOff val="25000"/>
+      </a:schemeClr>
+    </cs:fontRef>
+    <cs:defRPr sz="900"/>
+  </cs:trendlineLabel>
+  <cs:upBar>
+    <cs:lnRef idx="0"/>
+    <cs:fillRef idx="0"/>
+    <cs:effectRef idx="0"/>
+    <cs:fontRef idx="minor">
+      <a:schemeClr val="dk1"/>
+    </cs:fontRef>
+    <cs:spPr>
+      <a:solidFill>
+        <a:schemeClr val="lt1"/>
+      </a:solidFill>
+      <a:ln w="9525">
+        <a:solidFill>
+          <a:schemeClr val="dk1">
+            <a:lumMod val="65000"/>
+            <a:lumOff val="35000"/>
+          </a:schemeClr>
+        </a:solidFill>
+      </a:ln>
+    </cs:spPr>
+  </cs:upBar>
+  <cs:valueAxis>
+    <cs:lnRef idx="0"/>
+    <cs:fillRef idx="0"/>
+    <cs:effectRef idx="0"/>
+    <cs:fontRef idx="minor">
+      <a:schemeClr val="dk1">
+        <a:lumMod val="75000"/>
+        <a:lumOff val="25000"/>
+      </a:schemeClr>
+    </cs:fontRef>
+    <cs:defRPr sz="900"/>
+  </cs:valueAxis>
+  <cs:wall>
+    <cs:lnRef idx="0"/>
+    <cs:fillRef idx="0"/>
+    <cs:effectRef idx="0"/>
+    <cs:fontRef idx="minor">
+      <a:schemeClr val="dk1"/>
+    </cs:fontRef>
+  </cs:wall>
+</cs:chartStyle>
 </file>
 
 <file path=ppt/slideLayouts/slideLayout1.xml><?xml version="1.0" encoding="utf-8"?>
@@ -4334,13 +5863,8 @@
             <a:pPr lvl="1"/>
             <a:r>
               <a:rPr lang="es-ES_tradnl" dirty="0"/>
-              <a:t>La continuidad </a:t>
-            </a:r>
-            <a:r>
-              <a:rPr lang="es-ES_tradnl"/>
-              <a:t>de negocio es más segura</a:t>
-            </a:r>
-            <a:endParaRPr lang="es-ES_tradnl" dirty="0"/>
+              <a:t>La continuidad de negocio es más segura</a:t>
+            </a:r>
           </a:p>
           <a:p>
             <a:pPr lvl="1"/>
@@ -4352,6 +5876,197 @@
     <p:extLst>
       <p:ext uri="{BB962C8B-B14F-4D97-AF65-F5344CB8AC3E}">
         <p14:creationId xmlns:p14="http://schemas.microsoft.com/office/powerpoint/2010/main" val="4052906710"/>
+      </p:ext>
+    </p:extLst>
+  </p:cSld>
+  <p:clrMapOvr>
+    <a:masterClrMapping/>
+  </p:clrMapOvr>
+</p:sld>
+</file>
+
+<file path=ppt/slides/slide13.xml><?xml version="1.0" encoding="utf-8"?>
+<p:sld xmlns:a="http://schemas.openxmlformats.org/drawingml/2006/main" xmlns:r="http://schemas.openxmlformats.org/officeDocument/2006/relationships" xmlns:p="http://schemas.openxmlformats.org/presentationml/2006/main">
+  <p:cSld>
+    <p:spTree>
+      <p:nvGrpSpPr>
+        <p:cNvPr id="1" name=""/>
+        <p:cNvGrpSpPr/>
+        <p:nvPr/>
+      </p:nvGrpSpPr>
+      <p:grpSpPr>
+        <a:xfrm>
+          <a:off x="0" y="0"/>
+          <a:ext cx="0" cy="0"/>
+          <a:chOff x="0" y="0"/>
+          <a:chExt cx="0" cy="0"/>
+        </a:xfrm>
+      </p:grpSpPr>
+      <p:sp>
+        <p:nvSpPr>
+          <p:cNvPr id="2" name="Title 1">
+            <a:extLst>
+              <a:ext uri="{FF2B5EF4-FFF2-40B4-BE49-F238E27FC236}">
+                <a16:creationId xmlns:a16="http://schemas.microsoft.com/office/drawing/2014/main" id="{64009C99-8723-3033-422C-F173CA9FC2E2}"/>
+              </a:ext>
+            </a:extLst>
+          </p:cNvPr>
+          <p:cNvSpPr>
+            <a:spLocks noGrp="1"/>
+          </p:cNvSpPr>
+          <p:nvPr>
+            <p:ph type="title"/>
+          </p:nvPr>
+        </p:nvSpPr>
+        <p:spPr/>
+        <p:txBody>
+          <a:bodyPr/>
+          <a:lstStyle/>
+          <a:p>
+            <a:r>
+              <a:rPr lang="es-ES_tradnl" dirty="0"/>
+              <a:t>Los managers más grandes (Total = 140bi)</a:t>
+            </a:r>
+          </a:p>
+        </p:txBody>
+      </p:sp>
+      <mc:AlternateContent xmlns:mc="http://schemas.openxmlformats.org/markup-compatibility/2006">
+        <mc:Choice xmlns:cx1="http://schemas.microsoft.com/office/drawing/2015/9/8/chartex" Requires="cx1">
+          <p:graphicFrame>
+            <p:nvGraphicFramePr>
+              <p:cNvPr id="8" name="Content Placeholder 7">
+                <a:extLst>
+                  <a:ext uri="{FF2B5EF4-FFF2-40B4-BE49-F238E27FC236}">
+                    <a16:creationId xmlns:a16="http://schemas.microsoft.com/office/drawing/2014/main" id="{CA9129E6-6D2C-3F4B-99DD-1C3C0DFE1D73}"/>
+                  </a:ext>
+                </a:extLst>
+              </p:cNvPr>
+              <p:cNvGraphicFramePr>
+                <a:graphicFrameLocks noGrp="1"/>
+              </p:cNvGraphicFramePr>
+              <p:nvPr>
+                <p:ph idx="1"/>
+                <p:extLst>
+                  <p:ext uri="{D42A27DB-BD31-4B8C-83A1-F6EECF244321}">
+                    <p14:modId xmlns:p14="http://schemas.microsoft.com/office/powerpoint/2010/main" val="1594074576"/>
+                  </p:ext>
+                </p:extLst>
+              </p:nvPr>
+            </p:nvGraphicFramePr>
+            <p:xfrm>
+              <a:off x="838200" y="1825625"/>
+              <a:ext cx="10515600" cy="4351338"/>
+            </p:xfrm>
+            <a:graphic>
+              <a:graphicData uri="http://schemas.microsoft.com/office/drawing/2014/chartex">
+                <cx:chart xmlns:cx="http://schemas.microsoft.com/office/drawing/2014/chartex" xmlns:r="http://schemas.openxmlformats.org/officeDocument/2006/relationships" r:id="rId2"/>
+              </a:graphicData>
+            </a:graphic>
+          </p:graphicFrame>
+        </mc:Choice>
+        <mc:Fallback>
+          <p:pic>
+            <p:nvPicPr>
+              <p:cNvPr id="8" name="Content Placeholder 7">
+                <a:extLst>
+                  <a:ext uri="{FF2B5EF4-FFF2-40B4-BE49-F238E27FC236}">
+                    <a16:creationId xmlns:a16="http://schemas.microsoft.com/office/drawing/2014/main" id="{CA9129E6-6D2C-3F4B-99DD-1C3C0DFE1D73}"/>
+                  </a:ext>
+                </a:extLst>
+              </p:cNvPr>
+              <p:cNvPicPr>
+                <a:picLocks noGrp="1" noRot="1" noChangeAspect="1" noMove="1" noResize="1" noEditPoints="1" noAdjustHandles="1" noChangeArrowheads="1" noChangeShapeType="1"/>
+              </p:cNvPicPr>
+              <p:nvPr/>
+            </p:nvPicPr>
+            <p:blipFill>
+              <a:blip r:embed="rId3"/>
+              <a:stretch>
+                <a:fillRect/>
+              </a:stretch>
+            </p:blipFill>
+            <p:spPr>
+              <a:xfrm>
+                <a:off x="838200" y="1825625"/>
+                <a:ext cx="10515600" cy="4351338"/>
+              </a:xfrm>
+              <a:prstGeom prst="rect">
+                <a:avLst/>
+              </a:prstGeom>
+            </p:spPr>
+          </p:pic>
+        </mc:Fallback>
+      </mc:AlternateContent>
+      <mc:AlternateContent xmlns:mc="http://schemas.openxmlformats.org/markup-compatibility/2006">
+        <mc:Choice xmlns:cx1="http://schemas.microsoft.com/office/drawing/2015/9/8/chartex" Requires="cx1">
+          <p:graphicFrame>
+            <p:nvGraphicFramePr>
+              <p:cNvPr id="9" name="Content Placeholder 7">
+                <a:extLst>
+                  <a:ext uri="{FF2B5EF4-FFF2-40B4-BE49-F238E27FC236}">
+                    <a16:creationId xmlns:a16="http://schemas.microsoft.com/office/drawing/2014/main" id="{A1FF0FD4-AE73-44F2-FED2-DFED75DBCE5E}"/>
+                  </a:ext>
+                </a:extLst>
+              </p:cNvPr>
+              <p:cNvGraphicFramePr>
+                <a:graphicFrameLocks/>
+              </p:cNvGraphicFramePr>
+              <p:nvPr>
+                <p:extLst>
+                  <p:ext uri="{D42A27DB-BD31-4B8C-83A1-F6EECF244321}">
+                    <p14:modId xmlns:p14="http://schemas.microsoft.com/office/powerpoint/2010/main" val="1447576711"/>
+                  </p:ext>
+                </p:extLst>
+              </p:nvPr>
+            </p:nvGraphicFramePr>
+            <p:xfrm>
+              <a:off x="838200" y="1960562"/>
+              <a:ext cx="10515600" cy="4351338"/>
+            </p:xfrm>
+            <a:graphic>
+              <a:graphicData uri="http://schemas.microsoft.com/office/drawing/2014/chartex">
+                <cx:chart xmlns:cx="http://schemas.microsoft.com/office/drawing/2014/chartex" xmlns:r="http://schemas.openxmlformats.org/officeDocument/2006/relationships" r:id="rId4"/>
+              </a:graphicData>
+            </a:graphic>
+          </p:graphicFrame>
+        </mc:Choice>
+        <mc:Fallback>
+          <p:pic>
+            <p:nvPicPr>
+              <p:cNvPr id="9" name="Content Placeholder 7">
+                <a:extLst>
+                  <a:ext uri="{FF2B5EF4-FFF2-40B4-BE49-F238E27FC236}">
+                    <a16:creationId xmlns:a16="http://schemas.microsoft.com/office/drawing/2014/main" id="{A1FF0FD4-AE73-44F2-FED2-DFED75DBCE5E}"/>
+                  </a:ext>
+                </a:extLst>
+              </p:cNvPr>
+              <p:cNvPicPr>
+                <a:picLocks noGrp="1" noRot="1" noChangeAspect="1" noMove="1" noResize="1" noEditPoints="1" noAdjustHandles="1" noChangeArrowheads="1" noChangeShapeType="1"/>
+              </p:cNvPicPr>
+              <p:nvPr/>
+            </p:nvPicPr>
+            <p:blipFill>
+              <a:blip r:embed="rId5"/>
+              <a:stretch>
+                <a:fillRect/>
+              </a:stretch>
+            </p:blipFill>
+            <p:spPr>
+              <a:xfrm>
+                <a:off x="838200" y="1960562"/>
+                <a:ext cx="10515600" cy="4351338"/>
+              </a:xfrm>
+              <a:prstGeom prst="rect">
+                <a:avLst/>
+              </a:prstGeom>
+            </p:spPr>
+          </p:pic>
+        </mc:Fallback>
+      </mc:AlternateContent>
+    </p:spTree>
+    <p:extLst>
+      <p:ext uri="{BB962C8B-B14F-4D97-AF65-F5344CB8AC3E}">
+        <p14:creationId xmlns:p14="http://schemas.microsoft.com/office/powerpoint/2010/main" val="330283436"/>
       </p:ext>
     </p:extLst>
   </p:cSld>

</xml_diff>